<commit_message>
updated slides as Shepherd writeup was already done
</commit_message>
<xml_diff>
--- a/presentations/slides-117-anima-update-jws-voucher.pptx
+++ b/presentations/slides-117-anima-update-jws-voucher.pptx
@@ -226,7 +226,7 @@
           <a:p>
             <a:fld id="{33B5B5E8-CA78-4A82-83A0-867EF5A818AE}" type="datetimeFigureOut">
               <a:rPr lang="en-US" smtClean="0"/>
-              <a:t>7/11/2023</a:t>
+              <a:t>7/14/2023</a:t>
             </a:fld>
             <a:endParaRPr lang="en-US"/>
           </a:p>
@@ -900,7 +900,7 @@
           <a:p>
             <a:fld id="{8C792E63-5F21-4F54-A864-D84D9F273FCA}" type="datetimeFigureOut">
               <a:rPr lang="en-US" smtClean="0"/>
-              <a:t>7/11/2023</a:t>
+              <a:t>7/14/2023</a:t>
             </a:fld>
             <a:endParaRPr lang="en-US" dirty="0"/>
           </a:p>
@@ -1118,7 +1118,7 @@
           <a:p>
             <a:fld id="{8C792E63-5F21-4F54-A864-D84D9F273FCA}" type="datetimeFigureOut">
               <a:rPr lang="en-US" smtClean="0"/>
-              <a:t>7/11/2023</a:t>
+              <a:t>7/14/2023</a:t>
             </a:fld>
             <a:endParaRPr lang="en-US"/>
           </a:p>
@@ -1342,7 +1342,7 @@
           <a:p>
             <a:fld id="{8C792E63-5F21-4F54-A864-D84D9F273FCA}" type="datetimeFigureOut">
               <a:rPr lang="en-US" smtClean="0"/>
-              <a:t>7/11/2023</a:t>
+              <a:t>7/14/2023</a:t>
             </a:fld>
             <a:endParaRPr lang="en-US"/>
           </a:p>
@@ -1556,7 +1556,7 @@
           <a:p>
             <a:fld id="{8C792E63-5F21-4F54-A864-D84D9F273FCA}" type="datetimeFigureOut">
               <a:rPr lang="en-US" smtClean="0"/>
-              <a:t>7/11/2023</a:t>
+              <a:t>7/14/2023</a:t>
             </a:fld>
             <a:endParaRPr lang="en-US"/>
           </a:p>
@@ -1847,7 +1847,7 @@
           <a:p>
             <a:fld id="{8C792E63-5F21-4F54-A864-D84D9F273FCA}" type="datetimeFigureOut">
               <a:rPr lang="en-US" smtClean="0"/>
-              <a:t>7/11/2023</a:t>
+              <a:t>7/14/2023</a:t>
             </a:fld>
             <a:endParaRPr lang="en-US"/>
           </a:p>
@@ -2128,7 +2128,7 @@
           <a:p>
             <a:fld id="{8C792E63-5F21-4F54-A864-D84D9F273FCA}" type="datetimeFigureOut">
               <a:rPr lang="en-US" smtClean="0"/>
-              <a:t>7/11/2023</a:t>
+              <a:t>7/14/2023</a:t>
             </a:fld>
             <a:endParaRPr lang="en-US"/>
           </a:p>
@@ -2556,7 +2556,7 @@
           <a:p>
             <a:fld id="{8C792E63-5F21-4F54-A864-D84D9F273FCA}" type="datetimeFigureOut">
               <a:rPr lang="en-US" smtClean="0"/>
-              <a:t>7/11/2023</a:t>
+              <a:t>7/14/2023</a:t>
             </a:fld>
             <a:endParaRPr lang="en-US"/>
           </a:p>
@@ -2713,7 +2713,7 @@
           <a:p>
             <a:fld id="{8C792E63-5F21-4F54-A864-D84D9F273FCA}" type="datetimeFigureOut">
               <a:rPr lang="en-US" smtClean="0"/>
-              <a:t>7/11/2023</a:t>
+              <a:t>7/14/2023</a:t>
             </a:fld>
             <a:endParaRPr lang="en-US"/>
           </a:p>
@@ -2842,7 +2842,7 @@
           <a:p>
             <a:fld id="{8C792E63-5F21-4F54-A864-D84D9F273FCA}" type="datetimeFigureOut">
               <a:rPr lang="en-US" smtClean="0"/>
-              <a:t>7/11/2023</a:t>
+              <a:t>7/14/2023</a:t>
             </a:fld>
             <a:endParaRPr lang="en-US"/>
           </a:p>
@@ -3169,7 +3169,7 @@
           <a:p>
             <a:fld id="{8C792E63-5F21-4F54-A864-D84D9F273FCA}" type="datetimeFigureOut">
               <a:rPr lang="en-US" smtClean="0"/>
-              <a:t>7/11/2023</a:t>
+              <a:t>7/14/2023</a:t>
             </a:fld>
             <a:endParaRPr lang="en-US"/>
           </a:p>
@@ -3473,7 +3473,7 @@
           <a:p>
             <a:fld id="{8C792E63-5F21-4F54-A864-D84D9F273FCA}" type="datetimeFigureOut">
               <a:rPr lang="en-US" smtClean="0"/>
-              <a:t>7/11/2023</a:t>
+              <a:t>7/14/2023</a:t>
             </a:fld>
             <a:endParaRPr lang="en-US"/>
           </a:p>
@@ -3765,7 +3765,7 @@
           <a:p>
             <a:fld id="{8C792E63-5F21-4F54-A864-D84D9F273FCA}" type="datetimeFigureOut">
               <a:rPr lang="en-US" smtClean="0"/>
-              <a:t>7/11/2023</a:t>
+              <a:t>7/14/2023</a:t>
             </a:fld>
             <a:endParaRPr lang="en-US"/>
           </a:p>
@@ -4604,7 +4604,7 @@
             <a:fld id="{8C792E63-5F21-4F54-A864-D84D9F273FCA}" type="datetimeFigureOut">
               <a:rPr lang="en-US" smtClean="0"/>
               <a:pPr/>
-              <a:t>7/11/2023</a:t>
+              <a:t>7/14/2023</a:t>
             </a:fld>
             <a:endParaRPr lang="en-US"/>
           </a:p>
@@ -5144,7 +5144,7 @@
             <a:fld id="{8C792E63-5F21-4F54-A864-D84D9F273FCA}" type="datetimeFigureOut">
               <a:rPr lang="en-US" smtClean="0"/>
               <a:pPr/>
-              <a:t>7/11/2023</a:t>
+              <a:t>7/14/2023</a:t>
             </a:fld>
             <a:endParaRPr lang="en-US"/>
           </a:p>
@@ -5387,7 +5387,10 @@
                 <a:spcPct val="100000"/>
               </a:lnSpc>
             </a:pPr>
-            <a:endParaRPr lang="en-US" dirty="0"/>
+            <a:r>
+              <a:rPr lang="en-US" dirty="0"/>
+              <a:t>Shepherd writeup has already been circulated</a:t>
+            </a:r>
           </a:p>
           <a:p>
             <a:pPr>
@@ -5395,6 +5398,14 @@
                 <a:spcPct val="100000"/>
               </a:lnSpc>
             </a:pPr>
+            <a:endParaRPr lang="en-US" dirty="0"/>
+          </a:p>
+          <a:p>
+            <a:pPr>
+              <a:lnSpc>
+                <a:spcPct val="100000"/>
+              </a:lnSpc>
+            </a:pPr>
             <a:r>
               <a:rPr lang="en-US" dirty="0"/>
               <a:t>Interop testing with others welcome </a:t>
@@ -5431,15 +5442,12 @@
             </a:pPr>
             <a:r>
               <a:rPr lang="en-US" dirty="0"/>
-              <a:t>Finalization of document, shepherd writeup</a:t>
-            </a:r>
-          </a:p>
-          <a:p>
-            <a:pPr>
-              <a:lnSpc>
-                <a:spcPct val="100000"/>
-              </a:lnSpc>
-            </a:pPr>
+              <a:t>Finalization </a:t>
+            </a:r>
+            <a:r>
+              <a:rPr lang="en-US"/>
+              <a:t>of document </a:t>
+            </a:r>
             <a:endParaRPr lang="en-US" sz="2200" dirty="0"/>
           </a:p>
           <a:p>
@@ -5579,7 +5587,7 @@
             <a:fld id="{8C792E63-5F21-4F54-A864-D84D9F273FCA}" type="datetimeFigureOut">
               <a:rPr lang="en-US" smtClean="0"/>
               <a:pPr/>
-              <a:t>7/11/2023</a:t>
+              <a:t>7/14/2023</a:t>
             </a:fld>
             <a:endParaRPr lang="en-US" dirty="0"/>
           </a:p>

</xml_diff>